<commit_message>
Change methodology diagrams. integrate last intro
</commit_message>
<xml_diff>
--- a/docs/AI-Data-ML-ArchitectureDiagrams.pptx
+++ b/docs/AI-Data-ML-ArchitectureDiagrams.pptx
@@ -226,7 +226,7 @@
           <a:p>
             <a:fld id="{43B1B1F9-D0CB-FF4D-BEE0-BED1F1FDA196}" type="datetimeFigureOut">
               <a:rPr lang="en-US" smtClean="0"/>
-              <a:t>6/14/19</a:t>
+              <a:t>6/19/19</a:t>
             </a:fld>
             <a:endParaRPr lang="en-US"/>
           </a:p>
@@ -391,7 +391,7 @@
           <a:p>
             <a:fld id="{26BE012A-D992-5D42-B86E-AA2BC0764EE1}" type="datetimeFigureOut">
               <a:rPr lang="en-US" smtClean="0"/>
-              <a:t>6/14/19</a:t>
+              <a:t>6/19/19</a:t>
             </a:fld>
             <a:endParaRPr lang="en-US"/>
           </a:p>
@@ -2519,7 +2519,7 @@
           </a:ln>
           <a:extLst>
             <a:ext uri="{C572A759-6A51-4108-AA02-DFA0A04FC94B}">
-              <ma14:wrappingTextBoxFlag xmlns:ma14="http://schemas.microsoft.com/office/mac/drawingml/2011/main" xmlns="" val="1"/>
+              <ma14:wrappingTextBoxFlag xmlns="" xmlns:ma14="http://schemas.microsoft.com/office/mac/drawingml/2011/main" val="1"/>
             </a:ext>
           </a:extLst>
         </p:spPr>
@@ -2662,10 +2662,10 @@
           </a:ln>
           <a:extLst>
             <a:ext uri="{FAA26D3D-D897-4be2-8F04-BA451C77F1D7}">
-              <ma14:placeholderFlag xmlns="" xmlns:ma14="http://schemas.microsoft.com/office/mac/drawingml/2011/main" val="1"/>
+              <ma14:placeholderFlag xmlns:ma14="http://schemas.microsoft.com/office/mac/drawingml/2011/main" xmlns="" val="1"/>
             </a:ext>
             <a:ext uri="{909E8E84-426E-40dd-AFC4-6F175D3DCCD1}">
-              <a14:hiddenFill xmlns="" xmlns:a14="http://schemas.microsoft.com/office/drawing/2010/main">
+              <a14:hiddenFill xmlns:a14="http://schemas.microsoft.com/office/drawing/2010/main" xmlns="">
                 <a:solidFill>
                   <a:srgbClr val="FFFFFF"/>
                 </a:solidFill>
@@ -2716,10 +2716,10 @@
           </a:ln>
           <a:extLst>
             <a:ext uri="{FAA26D3D-D897-4be2-8F04-BA451C77F1D7}">
-              <ma14:placeholderFlag xmlns="" xmlns:ma14="http://schemas.microsoft.com/office/mac/drawingml/2011/main" val="1"/>
+              <ma14:placeholderFlag xmlns:ma14="http://schemas.microsoft.com/office/mac/drawingml/2011/main" xmlns="" val="1"/>
             </a:ext>
             <a:ext uri="{909E8E84-426E-40dd-AFC4-6F175D3DCCD1}">
-              <a14:hiddenFill xmlns="" xmlns:a14="http://schemas.microsoft.com/office/drawing/2010/main">
+              <a14:hiddenFill xmlns:a14="http://schemas.microsoft.com/office/drawing/2010/main" xmlns="">
                 <a:solidFill>
                   <a:srgbClr val="FFFFFF"/>
                 </a:solidFill>
@@ -3428,14 +3428,14 @@
             <p:ph sz="half" idx="1"/>
             <p:extLst>
               <p:ext uri="{D42A27DB-BD31-4B8C-83A1-F6EECF244321}">
-                <p14:modId xmlns:p14="http://schemas.microsoft.com/office/powerpoint/2010/main" val="3793640644"/>
+                <p14:modId xmlns:p14="http://schemas.microsoft.com/office/powerpoint/2010/main" val="2324657743"/>
               </p:ext>
             </p:extLst>
           </p:nvPr>
         </p:nvGraphicFramePr>
         <p:xfrm>
           <a:off x="457198" y="775461"/>
-          <a:ext cx="7936992" cy="4086860"/>
+          <a:ext cx="7936992" cy="3721100"/>
         </p:xfrm>
         <a:graphic>
           <a:graphicData uri="http://schemas.openxmlformats.org/drawingml/2006/table">
@@ -3484,12 +3484,12 @@
                     <a:lstStyle/>
                     <a:p>
                       <a:r>
-                        <a:rPr lang="en-US" dirty="0"/>
+                        <a:rPr lang="en-US" sz="1600" dirty="0"/>
                         <a:t>Gets deep into the data to draw hidden insights for the business</a:t>
                       </a:r>
                     </a:p>
                   </a:txBody>
-                  <a:tcPr/>
+                  <a:tcPr anchor="ctr"/>
                 </a:tc>
                 <a:extLst>
                   <a:ext uri="{0D108BD9-81ED-4DB2-BD59-A6C34878D82A}">
@@ -3518,12 +3518,12 @@
                     <a:lstStyle/>
                     <a:p>
                       <a:r>
-                        <a:rPr lang="en-US" dirty="0"/>
+                        <a:rPr lang="en-US" sz="1600" dirty="0"/>
                         <a:t>Guides the data  transformation, define components as part of the runtime and modeling environments and define cloud native microservice scope</a:t>
                       </a:r>
                     </a:p>
                   </a:txBody>
-                  <a:tcPr/>
+                  <a:tcPr anchor="ctr"/>
                 </a:tc>
                 <a:extLst>
                   <a:ext uri="{0D108BD9-81ED-4DB2-BD59-A6C34878D82A}">
@@ -3552,12 +3552,12 @@
                     <a:lstStyle/>
                     <a:p>
                       <a:r>
-                        <a:rPr lang="en-US" dirty="0"/>
+                        <a:rPr lang="en-US" sz="1600" dirty="0"/>
                         <a:t>Designs how data is  organized &amp; ensures operability</a:t>
                       </a:r>
                     </a:p>
                   </a:txBody>
-                  <a:tcPr/>
+                  <a:tcPr anchor="ctr"/>
                 </a:tc>
                 <a:extLst>
                   <a:ext uri="{0D108BD9-81ED-4DB2-BD59-A6C34878D82A}">
@@ -3586,12 +3586,12 @@
                     <a:lstStyle/>
                     <a:p>
                       <a:r>
-                        <a:rPr lang="en-US" dirty="0"/>
+                        <a:rPr lang="en-US" sz="1600" dirty="0"/>
                         <a:t>Builds microservice applications that interact with data and models</a:t>
                       </a:r>
                     </a:p>
                   </a:txBody>
-                  <a:tcPr/>
+                  <a:tcPr anchor="ctr"/>
                 </a:tc>
                 <a:extLst>
                   <a:ext uri="{0D108BD9-81ED-4DB2-BD59-A6C34878D82A}">
@@ -3620,15 +3620,15 @@
                     <a:lstStyle/>
                     <a:p>
                       <a:r>
-                        <a:rPr lang="en-US" dirty="0"/>
+                        <a:rPr lang="en-US" sz="1600" dirty="0"/>
                         <a:t>Facilitates Design Thinking approaches</a:t>
                       </a:r>
                     </a:p>
                     <a:p>
-                      <a:endParaRPr lang="en-US" dirty="0"/>
+                      <a:endParaRPr lang="en-US" sz="1600" dirty="0"/>
                     </a:p>
                   </a:txBody>
-                  <a:tcPr/>
+                  <a:tcPr anchor="ctr"/>
                 </a:tc>
                 <a:extLst>
                   <a:ext uri="{0D108BD9-81ED-4DB2-BD59-A6C34878D82A}">
@@ -3706,7 +3706,7 @@
         </p:blipFill>
         <p:spPr>
           <a:xfrm>
-            <a:off x="404855" y="2691922"/>
+            <a:off x="482339" y="2329600"/>
             <a:ext cx="689906" cy="674242"/>
           </a:xfrm>
           <a:prstGeom prst="rect">
@@ -3742,7 +3742,7 @@
         </p:blipFill>
         <p:spPr>
           <a:xfrm>
-            <a:off x="457199" y="788782"/>
+            <a:off x="482338" y="797167"/>
             <a:ext cx="689907" cy="674243"/>
           </a:xfrm>
           <a:prstGeom prst="rect">
@@ -3778,7 +3778,7 @@
         </p:blipFill>
         <p:spPr>
           <a:xfrm>
-            <a:off x="457200" y="3382928"/>
+            <a:off x="486979" y="3088085"/>
             <a:ext cx="689907" cy="674243"/>
           </a:xfrm>
           <a:prstGeom prst="rect">
@@ -3814,7 +3814,7 @@
         </p:blipFill>
         <p:spPr>
           <a:xfrm flipH="1">
-            <a:off x="457197" y="1756545"/>
+            <a:off x="477302" y="1533635"/>
             <a:ext cx="694943" cy="666431"/>
           </a:xfrm>
           <a:prstGeom prst="rect">
@@ -3844,7 +3844,7 @@
         </p:blipFill>
         <p:spPr>
           <a:xfrm>
-            <a:off x="457198" y="4141101"/>
+            <a:off x="482337" y="3816741"/>
             <a:ext cx="689908" cy="674244"/>
           </a:xfrm>
           <a:prstGeom prst="rect">
@@ -7680,7 +7680,7 @@
               <a:effectLst/>
               <a:extLst>
                 <a:ext uri="{C572A759-6A51-4108-AA02-DFA0A04FC94B}">
-                  <ma14:wrappingTextBoxFlag xmlns:ma14="http://schemas.microsoft.com/office/mac/drawingml/2011/main" xmlns="" val="1"/>
+                  <ma14:wrappingTextBoxFlag xmlns="" xmlns:ma14="http://schemas.microsoft.com/office/mac/drawingml/2011/main" val="1"/>
                 </a:ext>
               </a:extLst>
             </p:spPr>
@@ -8052,7 +8052,7 @@
             <a:effectLst/>
             <a:extLst>
               <a:ext uri="{C572A759-6A51-4108-AA02-DFA0A04FC94B}">
-                <ma14:wrappingTextBoxFlag xmlns:ma14="http://schemas.microsoft.com/office/mac/drawingml/2011/main" xmlns="" val="1"/>
+                <ma14:wrappingTextBoxFlag xmlns="" xmlns:ma14="http://schemas.microsoft.com/office/mac/drawingml/2011/main" val="1"/>
               </a:ext>
             </a:extLst>
           </p:spPr>
@@ -8319,7 +8319,7 @@
               <a:effectLst/>
               <a:extLst>
                 <a:ext uri="{C572A759-6A51-4108-AA02-DFA0A04FC94B}">
-                  <ma14:wrappingTextBoxFlag xmlns:ma14="http://schemas.microsoft.com/office/mac/drawingml/2011/main" xmlns="" val="1"/>
+                  <ma14:wrappingTextBoxFlag xmlns="" xmlns:ma14="http://schemas.microsoft.com/office/mac/drawingml/2011/main" val="1"/>
                 </a:ext>
               </a:extLst>
             </p:spPr>
@@ -8550,7 +8550,7 @@
               <a:effectLst/>
               <a:extLst>
                 <a:ext uri="{C572A759-6A51-4108-AA02-DFA0A04FC94B}">
-                  <ma14:wrappingTextBoxFlag xmlns:ma14="http://schemas.microsoft.com/office/mac/drawingml/2011/main" xmlns="" val="1"/>
+                  <ma14:wrappingTextBoxFlag xmlns="" xmlns:ma14="http://schemas.microsoft.com/office/mac/drawingml/2011/main" val="1"/>
                 </a:ext>
               </a:extLst>
             </p:spPr>
@@ -8781,7 +8781,7 @@
               <a:effectLst/>
               <a:extLst>
                 <a:ext uri="{C572A759-6A51-4108-AA02-DFA0A04FC94B}">
-                  <ma14:wrappingTextBoxFlag xmlns="" xmlns:ma14="http://schemas.microsoft.com/office/mac/drawingml/2011/main" val="1"/>
+                  <ma14:wrappingTextBoxFlag xmlns:ma14="http://schemas.microsoft.com/office/mac/drawingml/2011/main" xmlns="" val="1"/>
                 </a:ext>
               </a:extLst>
             </p:spPr>
@@ -9340,7 +9340,7 @@
               <a:effectLst/>
               <a:extLst>
                 <a:ext uri="{C572A759-6A51-4108-AA02-DFA0A04FC94B}">
-                  <ma14:wrappingTextBoxFlag xmlns:ma14="http://schemas.microsoft.com/office/mac/drawingml/2011/main" xmlns="" val="1"/>
+                  <ma14:wrappingTextBoxFlag xmlns="" xmlns:ma14="http://schemas.microsoft.com/office/mac/drawingml/2011/main" val="1"/>
                 </a:ext>
               </a:extLst>
             </p:spPr>
@@ -9572,7 +9572,7 @@
               <a:effectLst/>
               <a:extLst>
                 <a:ext uri="{C572A759-6A51-4108-AA02-DFA0A04FC94B}">
-                  <ma14:wrappingTextBoxFlag xmlns:ma14="http://schemas.microsoft.com/office/mac/drawingml/2011/main" xmlns="" val="1"/>
+                  <ma14:wrappingTextBoxFlag xmlns="" xmlns:ma14="http://schemas.microsoft.com/office/mac/drawingml/2011/main" val="1"/>
                 </a:ext>
               </a:extLst>
             </p:spPr>
@@ -9770,7 +9770,7 @@
               <a:effectLst/>
               <a:extLst>
                 <a:ext uri="{C572A759-6A51-4108-AA02-DFA0A04FC94B}">
-                  <ma14:wrappingTextBoxFlag xmlns="" xmlns:ma14="http://schemas.microsoft.com/office/mac/drawingml/2011/main" val="1"/>
+                  <ma14:wrappingTextBoxFlag xmlns:ma14="http://schemas.microsoft.com/office/mac/drawingml/2011/main" xmlns="" val="1"/>
                 </a:ext>
               </a:extLst>
             </p:spPr>
@@ -10045,7 +10045,7 @@
               <a:effectLst/>
               <a:extLst>
                 <a:ext uri="{C572A759-6A51-4108-AA02-DFA0A04FC94B}">
-                  <ma14:wrappingTextBoxFlag xmlns:ma14="http://schemas.microsoft.com/office/mac/drawingml/2011/main" xmlns="" val="1"/>
+                  <ma14:wrappingTextBoxFlag xmlns="" xmlns:ma14="http://schemas.microsoft.com/office/mac/drawingml/2011/main" val="1"/>
                 </a:ext>
               </a:extLst>
             </p:spPr>
@@ -10390,7 +10390,7 @@
               <a:effectLst/>
               <a:extLst>
                 <a:ext uri="{C572A759-6A51-4108-AA02-DFA0A04FC94B}">
-                  <ma14:wrappingTextBoxFlag xmlns="" xmlns:ma14="http://schemas.microsoft.com/office/mac/drawingml/2011/main" val="1"/>
+                  <ma14:wrappingTextBoxFlag xmlns:ma14="http://schemas.microsoft.com/office/mac/drawingml/2011/main" xmlns="" val="1"/>
                 </a:ext>
               </a:extLst>
             </p:spPr>
@@ -10799,7 +10799,7 @@
               <a:effectLst/>
               <a:extLst>
                 <a:ext uri="{C572A759-6A51-4108-AA02-DFA0A04FC94B}">
-                  <ma14:wrappingTextBoxFlag xmlns:ma14="http://schemas.microsoft.com/office/mac/drawingml/2011/main" xmlns="" val="1"/>
+                  <ma14:wrappingTextBoxFlag xmlns="" xmlns:ma14="http://schemas.microsoft.com/office/mac/drawingml/2011/main" val="1"/>
                 </a:ext>
               </a:extLst>
             </p:spPr>
@@ -11040,7 +11040,7 @@
               <a:effectLst/>
               <a:extLst>
                 <a:ext uri="{C572A759-6A51-4108-AA02-DFA0A04FC94B}">
-                  <ma14:wrappingTextBoxFlag xmlns:ma14="http://schemas.microsoft.com/office/mac/drawingml/2011/main" xmlns="" val="1"/>
+                  <ma14:wrappingTextBoxFlag xmlns="" xmlns:ma14="http://schemas.microsoft.com/office/mac/drawingml/2011/main" val="1"/>
                 </a:ext>
               </a:extLst>
             </p:spPr>
@@ -11339,7 +11339,7 @@
               <a:effectLst/>
               <a:extLst>
                 <a:ext uri="{C572A759-6A51-4108-AA02-DFA0A04FC94B}">
-                  <ma14:wrappingTextBoxFlag xmlns:ma14="http://schemas.microsoft.com/office/mac/drawingml/2011/main" xmlns="" val="1"/>
+                  <ma14:wrappingTextBoxFlag xmlns="" xmlns:ma14="http://schemas.microsoft.com/office/mac/drawingml/2011/main" val="1"/>
                 </a:ext>
               </a:extLst>
             </p:spPr>
@@ -11580,7 +11580,7 @@
               <a:effectLst/>
               <a:extLst>
                 <a:ext uri="{C572A759-6A51-4108-AA02-DFA0A04FC94B}">
-                  <ma14:wrappingTextBoxFlag xmlns:ma14="http://schemas.microsoft.com/office/mac/drawingml/2011/main" xmlns="" val="1"/>
+                  <ma14:wrappingTextBoxFlag xmlns="" xmlns:ma14="http://schemas.microsoft.com/office/mac/drawingml/2011/main" val="1"/>
                 </a:ext>
               </a:extLst>
             </p:spPr>
@@ -11907,7 +11907,7 @@
               <a:effectLst/>
               <a:extLst>
                 <a:ext uri="{C572A759-6A51-4108-AA02-DFA0A04FC94B}">
-                  <ma14:wrappingTextBoxFlag xmlns:ma14="http://schemas.microsoft.com/office/mac/drawingml/2011/main" xmlns="" val="1"/>
+                  <ma14:wrappingTextBoxFlag xmlns="" xmlns:ma14="http://schemas.microsoft.com/office/mac/drawingml/2011/main" val="1"/>
                 </a:ext>
               </a:extLst>
             </p:spPr>
@@ -12214,7 +12214,7 @@
               <a:effectLst/>
               <a:extLst>
                 <a:ext uri="{C572A759-6A51-4108-AA02-DFA0A04FC94B}">
-                  <ma14:wrappingTextBoxFlag xmlns:ma14="http://schemas.microsoft.com/office/mac/drawingml/2011/main" xmlns="" val="1"/>
+                  <ma14:wrappingTextBoxFlag xmlns="" xmlns:ma14="http://schemas.microsoft.com/office/mac/drawingml/2011/main" val="1"/>
                 </a:ext>
               </a:extLst>
             </p:spPr>
@@ -12412,7 +12412,7 @@
               <a:effectLst/>
               <a:extLst>
                 <a:ext uri="{C572A759-6A51-4108-AA02-DFA0A04FC94B}">
-                  <ma14:wrappingTextBoxFlag xmlns:ma14="http://schemas.microsoft.com/office/mac/drawingml/2011/main" xmlns="" val="1"/>
+                  <ma14:wrappingTextBoxFlag xmlns="" xmlns:ma14="http://schemas.microsoft.com/office/mac/drawingml/2011/main" val="1"/>
                 </a:ext>
               </a:extLst>
             </p:spPr>
@@ -12621,7 +12621,7 @@
               <a:effectLst/>
               <a:extLst>
                 <a:ext uri="{C572A759-6A51-4108-AA02-DFA0A04FC94B}">
-                  <ma14:wrappingTextBoxFlag xmlns:ma14="http://schemas.microsoft.com/office/mac/drawingml/2011/main" xmlns="" val="1"/>
+                  <ma14:wrappingTextBoxFlag xmlns="" xmlns:ma14="http://schemas.microsoft.com/office/mac/drawingml/2011/main" val="1"/>
                 </a:ext>
               </a:extLst>
             </p:spPr>
@@ -13055,7 +13055,7 @@
               <a:effectLst/>
               <a:extLst>
                 <a:ext uri="{C572A759-6A51-4108-AA02-DFA0A04FC94B}">
-                  <ma14:wrappingTextBoxFlag xmlns:ma14="http://schemas.microsoft.com/office/mac/drawingml/2011/main" xmlns="" val="1"/>
+                  <ma14:wrappingTextBoxFlag xmlns="" xmlns:ma14="http://schemas.microsoft.com/office/mac/drawingml/2011/main" val="1"/>
                 </a:ext>
               </a:extLst>
             </p:spPr>
@@ -13253,7 +13253,7 @@
               <a:effectLst/>
               <a:extLst>
                 <a:ext uri="{C572A759-6A51-4108-AA02-DFA0A04FC94B}">
-                  <ma14:wrappingTextBoxFlag xmlns:ma14="http://schemas.microsoft.com/office/mac/drawingml/2011/main" xmlns="" val="1"/>
+                  <ma14:wrappingTextBoxFlag xmlns="" xmlns:ma14="http://schemas.microsoft.com/office/mac/drawingml/2011/main" val="1"/>
                 </a:ext>
               </a:extLst>
             </p:spPr>
@@ -13572,7 +13572,7 @@
               <a:effectLst/>
               <a:extLst>
                 <a:ext uri="{C572A759-6A51-4108-AA02-DFA0A04FC94B}">
-                  <ma14:wrappingTextBoxFlag xmlns="" xmlns:ma14="http://schemas.microsoft.com/office/mac/drawingml/2011/main" val="1"/>
+                  <ma14:wrappingTextBoxFlag xmlns:ma14="http://schemas.microsoft.com/office/mac/drawingml/2011/main" xmlns="" val="1"/>
                 </a:ext>
               </a:extLst>
             </p:spPr>
@@ -13891,7 +13891,7 @@
               <a:effectLst/>
               <a:extLst>
                 <a:ext uri="{C572A759-6A51-4108-AA02-DFA0A04FC94B}">
-                  <ma14:wrappingTextBoxFlag xmlns:ma14="http://schemas.microsoft.com/office/mac/drawingml/2011/main" xmlns="" val="1"/>
+                  <ma14:wrappingTextBoxFlag xmlns="" xmlns:ma14="http://schemas.microsoft.com/office/mac/drawingml/2011/main" val="1"/>
                 </a:ext>
               </a:extLst>
             </p:spPr>
@@ -14342,7 +14342,7 @@
               <a:effectLst/>
               <a:extLst>
                 <a:ext uri="{C572A759-6A51-4108-AA02-DFA0A04FC94B}">
-                  <ma14:wrappingTextBoxFlag xmlns:ma14="http://schemas.microsoft.com/office/mac/drawingml/2011/main" xmlns="" val="1"/>
+                  <ma14:wrappingTextBoxFlag xmlns="" xmlns:ma14="http://schemas.microsoft.com/office/mac/drawingml/2011/main" val="1"/>
                 </a:ext>
               </a:extLst>
             </p:spPr>
@@ -14711,7 +14711,7 @@
               <a:effectLst/>
               <a:extLst>
                 <a:ext uri="{C572A759-6A51-4108-AA02-DFA0A04FC94B}">
-                  <ma14:wrappingTextBoxFlag xmlns:ma14="http://schemas.microsoft.com/office/mac/drawingml/2011/main" xmlns="" val="1"/>
+                  <ma14:wrappingTextBoxFlag xmlns="" xmlns:ma14="http://schemas.microsoft.com/office/mac/drawingml/2011/main" val="1"/>
                 </a:ext>
               </a:extLst>
             </p:spPr>
@@ -14921,7 +14921,7 @@
               <a:effectLst/>
               <a:extLst>
                 <a:ext uri="{C572A759-6A51-4108-AA02-DFA0A04FC94B}">
-                  <ma14:wrappingTextBoxFlag xmlns:ma14="http://schemas.microsoft.com/office/mac/drawingml/2011/main" xmlns="" val="1"/>
+                  <ma14:wrappingTextBoxFlag xmlns="" xmlns:ma14="http://schemas.microsoft.com/office/mac/drawingml/2011/main" val="1"/>
                 </a:ext>
               </a:extLst>
             </p:spPr>
@@ -15162,7 +15162,7 @@
               <a:effectLst/>
               <a:extLst>
                 <a:ext uri="{C572A759-6A51-4108-AA02-DFA0A04FC94B}">
-                  <ma14:wrappingTextBoxFlag xmlns:ma14="http://schemas.microsoft.com/office/mac/drawingml/2011/main" xmlns="" val="1"/>
+                  <ma14:wrappingTextBoxFlag xmlns="" xmlns:ma14="http://schemas.microsoft.com/office/mac/drawingml/2011/main" val="1"/>
                 </a:ext>
               </a:extLst>
             </p:spPr>
@@ -15424,7 +15424,7 @@
               <a:effectLst/>
               <a:extLst>
                 <a:ext uri="{C572A759-6A51-4108-AA02-DFA0A04FC94B}">
-                  <ma14:wrappingTextBoxFlag xmlns:ma14="http://schemas.microsoft.com/office/mac/drawingml/2011/main" xmlns="" val="1"/>
+                  <ma14:wrappingTextBoxFlag xmlns="" xmlns:ma14="http://schemas.microsoft.com/office/mac/drawingml/2011/main" val="1"/>
                 </a:ext>
               </a:extLst>
             </p:spPr>
@@ -15732,7 +15732,7 @@
               <a:effectLst/>
               <a:extLst>
                 <a:ext uri="{C572A759-6A51-4108-AA02-DFA0A04FC94B}">
-                  <ma14:wrappingTextBoxFlag xmlns:ma14="http://schemas.microsoft.com/office/mac/drawingml/2011/main" xmlns="" val="1"/>
+                  <ma14:wrappingTextBoxFlag xmlns="" xmlns:ma14="http://schemas.microsoft.com/office/mac/drawingml/2011/main" val="1"/>
                 </a:ext>
               </a:extLst>
             </p:spPr>
@@ -16020,7 +16020,7 @@
               <a:effectLst/>
               <a:extLst>
                 <a:ext uri="{C572A759-6A51-4108-AA02-DFA0A04FC94B}">
-                  <ma14:wrappingTextBoxFlag xmlns:ma14="http://schemas.microsoft.com/office/mac/drawingml/2011/main" xmlns="" val="1"/>
+                  <ma14:wrappingTextBoxFlag xmlns="" xmlns:ma14="http://schemas.microsoft.com/office/mac/drawingml/2011/main" val="1"/>
                 </a:ext>
               </a:extLst>
             </p:spPr>
@@ -16378,7 +16378,7 @@
               <a:effectLst/>
               <a:extLst>
                 <a:ext uri="{C572A759-6A51-4108-AA02-DFA0A04FC94B}">
-                  <ma14:wrappingTextBoxFlag xmlns:ma14="http://schemas.microsoft.com/office/mac/drawingml/2011/main" xmlns="" val="1"/>
+                  <ma14:wrappingTextBoxFlag xmlns="" xmlns:ma14="http://schemas.microsoft.com/office/mac/drawingml/2011/main" val="1"/>
                 </a:ext>
               </a:extLst>
             </p:spPr>
@@ -20564,7 +20564,7 @@
             <a:effectLst/>
             <a:extLst>
               <a:ext uri="{C572A759-6A51-4108-AA02-DFA0A04FC94B}">
-                <ma14:wrappingTextBoxFlag xmlns="" xmlns:m="http://schemas.openxmlformats.org/officeDocument/2006/math" xmlns:a14="http://schemas.microsoft.com/office/drawing/2010/main" xmlns:ma14="http://schemas.microsoft.com/office/mac/drawingml/2011/main" val="1"/>
+                <ma14:wrappingTextBoxFlag xmlns:ma14="http://schemas.microsoft.com/office/mac/drawingml/2011/main" xmlns:a14="http://schemas.microsoft.com/office/drawing/2010/main" xmlns:m="http://schemas.openxmlformats.org/officeDocument/2006/math" xmlns="" val="1"/>
               </a:ext>
             </a:extLst>
           </p:spPr>
@@ -20739,7 +20739,7 @@
             <a:effectLst/>
             <a:extLst>
               <a:ext uri="{C572A759-6A51-4108-AA02-DFA0A04FC94B}">
-                <ma14:wrappingTextBoxFlag xmlns="" xmlns:m="http://schemas.openxmlformats.org/officeDocument/2006/math" xmlns:a14="http://schemas.microsoft.com/office/drawing/2010/main" xmlns:ma14="http://schemas.microsoft.com/office/mac/drawingml/2011/main" val="1"/>
+                <ma14:wrappingTextBoxFlag xmlns:ma14="http://schemas.microsoft.com/office/mac/drawingml/2011/main" xmlns:a14="http://schemas.microsoft.com/office/drawing/2010/main" xmlns:m="http://schemas.openxmlformats.org/officeDocument/2006/math" xmlns="" val="1"/>
               </a:ext>
             </a:extLst>
           </p:spPr>
@@ -20901,7 +20901,7 @@
             <a:effectLst/>
             <a:extLst>
               <a:ext uri="{C572A759-6A51-4108-AA02-DFA0A04FC94B}">
-                <ma14:wrappingTextBoxFlag xmlns="" xmlns:m="http://schemas.openxmlformats.org/officeDocument/2006/math" xmlns:a14="http://schemas.microsoft.com/office/drawing/2010/main" xmlns:ma14="http://schemas.microsoft.com/office/mac/drawingml/2011/main" val="1"/>
+                <ma14:wrappingTextBoxFlag xmlns:ma14="http://schemas.microsoft.com/office/mac/drawingml/2011/main" xmlns:a14="http://schemas.microsoft.com/office/drawing/2010/main" xmlns:m="http://schemas.openxmlformats.org/officeDocument/2006/math" xmlns="" val="1"/>
               </a:ext>
             </a:extLst>
           </p:spPr>
@@ -21063,7 +21063,7 @@
             <a:effectLst/>
             <a:extLst>
               <a:ext uri="{C572A759-6A51-4108-AA02-DFA0A04FC94B}">
-                <ma14:wrappingTextBoxFlag xmlns="" xmlns:m="http://schemas.openxmlformats.org/officeDocument/2006/math" xmlns:a14="http://schemas.microsoft.com/office/drawing/2010/main" xmlns:ma14="http://schemas.microsoft.com/office/mac/drawingml/2011/main" val="1"/>
+                <ma14:wrappingTextBoxFlag xmlns:ma14="http://schemas.microsoft.com/office/mac/drawingml/2011/main" xmlns:a14="http://schemas.microsoft.com/office/drawing/2010/main" xmlns:m="http://schemas.openxmlformats.org/officeDocument/2006/math" xmlns="" val="1"/>
               </a:ext>
             </a:extLst>
           </p:spPr>
@@ -21227,7 +21227,7 @@
             <a:effectLst/>
             <a:extLst>
               <a:ext uri="{C572A759-6A51-4108-AA02-DFA0A04FC94B}">
-                <ma14:wrappingTextBoxFlag xmlns="" xmlns:m="http://schemas.openxmlformats.org/officeDocument/2006/math" xmlns:a14="http://schemas.microsoft.com/office/drawing/2010/main" xmlns:ma14="http://schemas.microsoft.com/office/mac/drawingml/2011/main" val="1"/>
+                <ma14:wrappingTextBoxFlag xmlns:ma14="http://schemas.microsoft.com/office/mac/drawingml/2011/main" xmlns:a14="http://schemas.microsoft.com/office/drawing/2010/main" xmlns:m="http://schemas.openxmlformats.org/officeDocument/2006/math" xmlns="" val="1"/>
               </a:ext>
             </a:extLst>
           </p:spPr>
@@ -21391,7 +21391,7 @@
             <a:effectLst/>
             <a:extLst>
               <a:ext uri="{C572A759-6A51-4108-AA02-DFA0A04FC94B}">
-                <ma14:wrappingTextBoxFlag xmlns="" xmlns:m="http://schemas.openxmlformats.org/officeDocument/2006/math" xmlns:a14="http://schemas.microsoft.com/office/drawing/2010/main" xmlns:ma14="http://schemas.microsoft.com/office/mac/drawingml/2011/main" val="1"/>
+                <ma14:wrappingTextBoxFlag xmlns:ma14="http://schemas.microsoft.com/office/mac/drawingml/2011/main" xmlns:a14="http://schemas.microsoft.com/office/drawing/2010/main" xmlns:m="http://schemas.openxmlformats.org/officeDocument/2006/math" xmlns="" val="1"/>
               </a:ext>
             </a:extLst>
           </p:spPr>
@@ -21555,7 +21555,7 @@
             <a:effectLst/>
             <a:extLst>
               <a:ext uri="{C572A759-6A51-4108-AA02-DFA0A04FC94B}">
-                <ma14:wrappingTextBoxFlag xmlns="" xmlns:m="http://schemas.openxmlformats.org/officeDocument/2006/math" xmlns:a14="http://schemas.microsoft.com/office/drawing/2010/main" xmlns:ma14="http://schemas.microsoft.com/office/mac/drawingml/2011/main" val="1"/>
+                <ma14:wrappingTextBoxFlag xmlns:ma14="http://schemas.microsoft.com/office/mac/drawingml/2011/main" xmlns:a14="http://schemas.microsoft.com/office/drawing/2010/main" xmlns:m="http://schemas.openxmlformats.org/officeDocument/2006/math" xmlns="" val="1"/>
               </a:ext>
             </a:extLst>
           </p:spPr>
@@ -21656,8 +21656,12 @@
               </a:avLst>
             </a:prstGeom>
             <a:grpFill/>
-            <a:ln w="12700" cap="flat">
-              <a:noFill/>
+            <a:ln w="41275" cap="flat">
+              <a:solidFill>
+                <a:srgbClr val="FF0000">
+                  <a:alpha val="35000"/>
+                </a:srgbClr>
+              </a:solidFill>
               <a:miter lim="400000"/>
             </a:ln>
             <a:effectLst/>
@@ -21715,14 +21719,18 @@
               <a:avLst/>
             </a:prstGeom>
             <a:grpFill/>
-            <a:ln w="12700" cap="flat">
-              <a:noFill/>
+            <a:ln w="41275" cap="flat">
+              <a:solidFill>
+                <a:srgbClr val="FF0000">
+                  <a:alpha val="35000"/>
+                </a:srgbClr>
+              </a:solidFill>
               <a:miter lim="400000"/>
             </a:ln>
             <a:effectLst/>
             <a:extLst>
               <a:ext uri="{C572A759-6A51-4108-AA02-DFA0A04FC94B}">
-                <ma14:wrappingTextBoxFlag xmlns="" xmlns:m="http://schemas.openxmlformats.org/officeDocument/2006/math" xmlns:a14="http://schemas.microsoft.com/office/drawing/2010/main" xmlns:ma14="http://schemas.microsoft.com/office/mac/drawingml/2011/main" val="1"/>
+                <ma14:wrappingTextBoxFlag xmlns:ma14="http://schemas.microsoft.com/office/mac/drawingml/2011/main" xmlns:a14="http://schemas.microsoft.com/office/drawing/2010/main" xmlns:m="http://schemas.openxmlformats.org/officeDocument/2006/math" xmlns="" val="1"/>
               </a:ext>
             </a:extLst>
           </p:spPr>
@@ -21889,7 +21897,7 @@
             <a:effectLst/>
             <a:extLst>
               <a:ext uri="{C572A759-6A51-4108-AA02-DFA0A04FC94B}">
-                <ma14:wrappingTextBoxFlag xmlns="" xmlns:m="http://schemas.openxmlformats.org/officeDocument/2006/math" xmlns:a14="http://schemas.microsoft.com/office/drawing/2010/main" xmlns:ma14="http://schemas.microsoft.com/office/mac/drawingml/2011/main" val="1"/>
+                <ma14:wrappingTextBoxFlag xmlns:ma14="http://schemas.microsoft.com/office/mac/drawingml/2011/main" xmlns:a14="http://schemas.microsoft.com/office/drawing/2010/main" xmlns:m="http://schemas.openxmlformats.org/officeDocument/2006/math" xmlns="" val="1"/>
               </a:ext>
             </a:extLst>
           </p:spPr>
@@ -22100,7 +22108,7 @@
             <a:effectLst/>
             <a:extLst>
               <a:ext uri="{C572A759-6A51-4108-AA02-DFA0A04FC94B}">
-                <ma14:wrappingTextBoxFlag xmlns="" xmlns:m="http://schemas.openxmlformats.org/officeDocument/2006/math" xmlns:a14="http://schemas.microsoft.com/office/drawing/2010/main" xmlns:ma14="http://schemas.microsoft.com/office/mac/drawingml/2011/main" val="1"/>
+                <ma14:wrappingTextBoxFlag xmlns:ma14="http://schemas.microsoft.com/office/mac/drawingml/2011/main" xmlns:a14="http://schemas.microsoft.com/office/drawing/2010/main" xmlns:m="http://schemas.openxmlformats.org/officeDocument/2006/math" xmlns="" val="1"/>
               </a:ext>
             </a:extLst>
           </p:spPr>
@@ -22862,6 +22870,55 @@
           </a:fontRef>
         </p:style>
       </p:cxnSp>
+      <p:cxnSp>
+        <p:nvCxnSpPr>
+          <p:cNvPr id="51" name="Curved Connector 50">
+            <a:extLst>
+              <a:ext uri="{FF2B5EF4-FFF2-40B4-BE49-F238E27FC236}">
+                <a16:creationId xmlns:a16="http://schemas.microsoft.com/office/drawing/2014/main" id="{F53F92D1-4E2D-224D-AC52-24CDB2D57270}"/>
+              </a:ext>
+            </a:extLst>
+          </p:cNvPr>
+          <p:cNvCxnSpPr>
+            <a:cxnSpLocks/>
+            <a:stCxn id="28" idx="3"/>
+            <a:endCxn id="17" idx="1"/>
+          </p:cNvCxnSpPr>
+          <p:nvPr/>
+        </p:nvCxnSpPr>
+        <p:spPr>
+          <a:xfrm>
+            <a:off x="2524361" y="2777852"/>
+            <a:ext cx="3675133" cy="9185"/>
+          </a:xfrm>
+          <a:prstGeom prst="curvedConnector3">
+            <a:avLst>
+              <a:gd name="adj1" fmla="val 50000"/>
+            </a:avLst>
+          </a:prstGeom>
+          <a:ln w="38100">
+            <a:solidFill>
+              <a:srgbClr val="348CE7"/>
+            </a:solidFill>
+            <a:tailEnd type="triangle"/>
+          </a:ln>
+          <a:effectLst/>
+        </p:spPr>
+        <p:style>
+          <a:lnRef idx="2">
+            <a:schemeClr val="accent1"/>
+          </a:lnRef>
+          <a:fillRef idx="0">
+            <a:schemeClr val="accent1"/>
+          </a:fillRef>
+          <a:effectRef idx="1">
+            <a:schemeClr val="accent1"/>
+          </a:effectRef>
+          <a:fontRef idx="minor">
+            <a:schemeClr val="tx1"/>
+          </a:fontRef>
+        </p:style>
+      </p:cxnSp>
     </p:spTree>
     <p:extLst>
       <p:ext uri="{BB962C8B-B14F-4D97-AF65-F5344CB8AC3E}">
@@ -24153,8 +24210,8 @@
         </p:nvSpPr>
         <p:spPr>
           <a:xfrm>
-            <a:off x="3924900" y="4010862"/>
-            <a:ext cx="914400" cy="455838"/>
+            <a:off x="3899500" y="4010862"/>
+            <a:ext cx="762057" cy="455838"/>
           </a:xfrm>
           <a:prstGeom prst="rect">
             <a:avLst/>
@@ -24207,7 +24264,7 @@
               <a:tabLst/>
             </a:pPr>
             <a:r>
-              <a:rPr kumimoji="0" lang="en-US" sz="1000" b="0" i="0" u="none" strike="noStrike" kern="1200" cap="none" spc="0" normalizeH="0" baseline="0" noProof="0" dirty="0">
+              <a:rPr kumimoji="0" lang="en-US" sz="900" b="0" i="0" u="none" strike="noStrike" kern="1200" cap="none" spc="0" normalizeH="0" baseline="0" noProof="0" dirty="0">
                 <a:ln>
                   <a:noFill/>
                 </a:ln>
@@ -24329,7 +24386,7 @@
         </p:nvSpPr>
         <p:spPr>
           <a:xfrm>
-            <a:off x="454440" y="2282899"/>
+            <a:off x="1089440" y="2282899"/>
             <a:ext cx="2057400" cy="347870"/>
           </a:xfrm>
           <a:prstGeom prst="rect">
@@ -25255,93 +25312,6 @@
       </p:sp>
       <p:sp>
         <p:nvSpPr>
-          <p:cNvPr id="40" name="Rectangle 39">
-            <a:extLst>
-              <a:ext uri="{FF2B5EF4-FFF2-40B4-BE49-F238E27FC236}">
-                <a16:creationId xmlns:a16="http://schemas.microsoft.com/office/drawing/2014/main" id="{99D2E5ED-E93B-A942-8864-4ADEA5F6F801}"/>
-              </a:ext>
-            </a:extLst>
-          </p:cNvPr>
-          <p:cNvSpPr/>
-          <p:nvPr/>
-        </p:nvSpPr>
-        <p:spPr>
-          <a:xfrm>
-            <a:off x="4905841" y="4010862"/>
-            <a:ext cx="1097198" cy="455838"/>
-          </a:xfrm>
-          <a:prstGeom prst="rect">
-            <a:avLst/>
-          </a:prstGeom>
-          <a:solidFill>
-            <a:srgbClr val="44D035">
-              <a:alpha val="60000"/>
-            </a:srgbClr>
-          </a:solidFill>
-          <a:ln w="12700">
-            <a:solidFill>
-              <a:srgbClr val="92D050"/>
-            </a:solidFill>
-          </a:ln>
-        </p:spPr>
-        <p:style>
-          <a:lnRef idx="2">
-            <a:schemeClr val="accent1">
-              <a:shade val="50000"/>
-            </a:schemeClr>
-          </a:lnRef>
-          <a:fillRef idx="1">
-            <a:schemeClr val="accent1"/>
-          </a:fillRef>
-          <a:effectRef idx="0">
-            <a:schemeClr val="accent1"/>
-          </a:effectRef>
-          <a:fontRef idx="minor">
-            <a:schemeClr val="lt1"/>
-          </a:fontRef>
-        </p:style>
-        <p:txBody>
-          <a:bodyPr rtlCol="0" anchor="ctr"/>
-          <a:lstStyle/>
-          <a:p>
-            <a:pPr marL="0" marR="0" indent="0" algn="ctr" defTabSz="685800" rtl="0" eaLnBrk="1" fontAlgn="auto" latinLnBrk="0" hangingPunct="1">
-              <a:lnSpc>
-                <a:spcPct val="100000"/>
-              </a:lnSpc>
-              <a:spcBef>
-                <a:spcPts val="0"/>
-              </a:spcBef>
-              <a:spcAft>
-                <a:spcPts val="0"/>
-              </a:spcAft>
-              <a:buClrTx/>
-              <a:buSzTx/>
-              <a:buFontTx/>
-              <a:buNone/>
-              <a:tabLst/>
-            </a:pPr>
-            <a:r>
-              <a:rPr kumimoji="0" lang="en-US" sz="1000" b="0" i="0" u="none" strike="noStrike" kern="1200" cap="none" spc="0" normalizeH="0" baseline="0" noProof="0" dirty="0">
-                <a:ln>
-                  <a:noFill/>
-                </a:ln>
-                <a:solidFill>
-                  <a:schemeClr val="tx1"/>
-                </a:solidFill>
-                <a:effectLst/>
-                <a:uLnTx/>
-                <a:uFillTx/>
-                <a:latin typeface="Arial"/>
-                <a:ea typeface="+mn-ea"/>
-                <a:cs typeface="+mn-cs"/>
-              </a:rPr>
-              <a:t>Define Data API </a:t>
-            </a:r>
-          </a:p>
-        </p:txBody>
-      </p:sp>
-      <p:sp>
-        <p:nvSpPr>
           <p:cNvPr id="41" name="Rectangle 40">
             <a:extLst>
               <a:ext uri="{FF2B5EF4-FFF2-40B4-BE49-F238E27FC236}">
@@ -25361,12 +25331,16 @@
             <a:avLst/>
           </a:prstGeom>
           <a:solidFill>
-            <a:srgbClr val="BB59D6">
+            <a:srgbClr val="348CE7">
               <a:alpha val="36078"/>
             </a:srgbClr>
           </a:solidFill>
-          <a:ln w="12700">
-            <a:noFill/>
+          <a:ln w="47625">
+            <a:solidFill>
+              <a:srgbClr val="FF0000">
+                <a:alpha val="35000"/>
+              </a:srgbClr>
+            </a:solidFill>
           </a:ln>
         </p:spPr>
         <p:style>
@@ -25450,8 +25424,12 @@
               <a:alpha val="59000"/>
             </a:srgbClr>
           </a:solidFill>
-          <a:ln w="12700">
-            <a:noFill/>
+          <a:ln w="47625">
+            <a:solidFill>
+              <a:srgbClr val="FF0000">
+                <a:alpha val="34000"/>
+              </a:srgbClr>
+            </a:solidFill>
           </a:ln>
         </p:spPr>
         <p:style>
@@ -25535,8 +25513,10 @@
               <a:alpha val="60000"/>
             </a:srgbClr>
           </a:solidFill>
-          <a:ln w="12700">
-            <a:noFill/>
+          <a:ln w="44450">
+            <a:solidFill>
+              <a:srgbClr val="348CE7"/>
+            </a:solidFill>
           </a:ln>
         </p:spPr>
         <p:style>
@@ -25862,7 +25842,7 @@
         </p:nvSpPr>
         <p:spPr>
           <a:xfrm>
-            <a:off x="6074870" y="4010862"/>
+            <a:off x="6612134" y="4010862"/>
             <a:ext cx="914400" cy="455838"/>
           </a:xfrm>
           <a:prstGeom prst="rect">
@@ -25916,7 +25896,7 @@
               <a:tabLst/>
             </a:pPr>
             <a:r>
-              <a:rPr kumimoji="0" lang="en-US" sz="1000" b="0" i="0" u="none" strike="noStrike" kern="1200" cap="none" spc="0" normalizeH="0" baseline="0" noProof="0" dirty="0">
+              <a:rPr kumimoji="0" lang="en-US" sz="900" b="0" i="0" u="none" strike="noStrike" kern="1200" cap="none" spc="0" normalizeH="0" baseline="0" noProof="0" dirty="0">
                 <a:ln>
                   <a:noFill/>
                 </a:ln>
@@ -25930,92 +25910,7 @@
                 <a:ea typeface="+mn-ea"/>
                 <a:cs typeface="+mn-cs"/>
               </a:rPr>
-              <a:t>Tune Schema</a:t>
-            </a:r>
-          </a:p>
-        </p:txBody>
-      </p:sp>
-      <p:sp>
-        <p:nvSpPr>
-          <p:cNvPr id="49" name="Rectangle 48">
-            <a:extLst>
-              <a:ext uri="{FF2B5EF4-FFF2-40B4-BE49-F238E27FC236}">
-                <a16:creationId xmlns:a16="http://schemas.microsoft.com/office/drawing/2014/main" id="{41B4407D-A65A-DC48-9475-9F0AF768BA1D}"/>
-              </a:ext>
-            </a:extLst>
-          </p:cNvPr>
-          <p:cNvSpPr/>
-          <p:nvPr/>
-        </p:nvSpPr>
-        <p:spPr>
-          <a:xfrm>
-            <a:off x="7036401" y="4010862"/>
-            <a:ext cx="1513313" cy="455838"/>
-          </a:xfrm>
-          <a:prstGeom prst="rect">
-            <a:avLst/>
-          </a:prstGeom>
-          <a:solidFill>
-            <a:srgbClr val="44D035">
-              <a:alpha val="59000"/>
-            </a:srgbClr>
-          </a:solidFill>
-          <a:ln w="12700">
-            <a:noFill/>
-          </a:ln>
-        </p:spPr>
-        <p:style>
-          <a:lnRef idx="2">
-            <a:schemeClr val="accent1">
-              <a:shade val="50000"/>
-            </a:schemeClr>
-          </a:lnRef>
-          <a:fillRef idx="1">
-            <a:schemeClr val="accent1"/>
-          </a:fillRef>
-          <a:effectRef idx="0">
-            <a:schemeClr val="accent1"/>
-          </a:effectRef>
-          <a:fontRef idx="minor">
-            <a:schemeClr val="lt1"/>
-          </a:fontRef>
-        </p:style>
-        <p:txBody>
-          <a:bodyPr rtlCol="0" anchor="ctr"/>
-          <a:lstStyle/>
-          <a:p>
-            <a:pPr marL="0" marR="0" indent="0" algn="ctr" defTabSz="685800" rtl="0" eaLnBrk="1" fontAlgn="auto" latinLnBrk="0" hangingPunct="1">
-              <a:lnSpc>
-                <a:spcPct val="100000"/>
-              </a:lnSpc>
-              <a:spcBef>
-                <a:spcPts val="0"/>
-              </a:spcBef>
-              <a:spcAft>
-                <a:spcPts val="0"/>
-              </a:spcAft>
-              <a:buClrTx/>
-              <a:buSzTx/>
-              <a:buFontTx/>
-              <a:buNone/>
-              <a:tabLst/>
-            </a:pPr>
-            <a:r>
-              <a:rPr kumimoji="0" lang="en-US" sz="800" b="0" i="0" u="none" strike="noStrike" kern="1200" cap="none" spc="0" normalizeH="0" baseline="0" noProof="0" dirty="0">
-                <a:ln>
-                  <a:noFill/>
-                </a:ln>
-                <a:solidFill>
-                  <a:schemeClr val="tx1"/>
-                </a:solidFill>
-                <a:effectLst/>
-                <a:uLnTx/>
-                <a:uFillTx/>
-                <a:latin typeface="Arial"/>
-                <a:ea typeface="+mn-ea"/>
-                <a:cs typeface="+mn-cs"/>
-              </a:rPr>
-              <a:t>Tune Data access integration</a:t>
+              <a:t>Tune API, Schema, Integration</a:t>
             </a:r>
           </a:p>
         </p:txBody>
@@ -26365,7 +26260,7 @@
         </p:nvSpPr>
         <p:spPr>
           <a:xfrm rot="5400000">
-            <a:off x="8574988" y="4099928"/>
+            <a:off x="8536888" y="4099928"/>
             <a:ext cx="363640" cy="247918"/>
           </a:xfrm>
           <a:prstGeom prst="triangle">
@@ -26430,6 +26325,304 @@
               <a:ea typeface="+mn-ea"/>
               <a:cs typeface="+mn-cs"/>
             </a:endParaRPr>
+          </a:p>
+        </p:txBody>
+      </p:sp>
+      <p:sp>
+        <p:nvSpPr>
+          <p:cNvPr id="42" name="Rectangle 41">
+            <a:extLst>
+              <a:ext uri="{FF2B5EF4-FFF2-40B4-BE49-F238E27FC236}">
+                <a16:creationId xmlns:a16="http://schemas.microsoft.com/office/drawing/2014/main" id="{BCEE0FEE-079F-554A-9F0A-ED0D4C773D72}"/>
+              </a:ext>
+            </a:extLst>
+          </p:cNvPr>
+          <p:cNvSpPr/>
+          <p:nvPr/>
+        </p:nvSpPr>
+        <p:spPr>
+          <a:xfrm>
+            <a:off x="7611273" y="4010862"/>
+            <a:ext cx="914400" cy="455838"/>
+          </a:xfrm>
+          <a:prstGeom prst="rect">
+            <a:avLst/>
+          </a:prstGeom>
+          <a:solidFill>
+            <a:srgbClr val="44D035">
+              <a:alpha val="60000"/>
+            </a:srgbClr>
+          </a:solidFill>
+          <a:ln w="12700">
+            <a:solidFill>
+              <a:srgbClr val="92D050"/>
+            </a:solidFill>
+          </a:ln>
+        </p:spPr>
+        <p:style>
+          <a:lnRef idx="2">
+            <a:schemeClr val="accent1">
+              <a:shade val="50000"/>
+            </a:schemeClr>
+          </a:lnRef>
+          <a:fillRef idx="1">
+            <a:schemeClr val="accent1"/>
+          </a:fillRef>
+          <a:effectRef idx="0">
+            <a:schemeClr val="accent1"/>
+          </a:effectRef>
+          <a:fontRef idx="minor">
+            <a:schemeClr val="lt1"/>
+          </a:fontRef>
+        </p:style>
+        <p:txBody>
+          <a:bodyPr rtlCol="0" anchor="ctr"/>
+          <a:lstStyle/>
+          <a:p>
+            <a:pPr marL="0" marR="0" indent="0" algn="ctr" defTabSz="685800" rtl="0" eaLnBrk="1" fontAlgn="auto" latinLnBrk="0" hangingPunct="1">
+              <a:lnSpc>
+                <a:spcPct val="100000"/>
+              </a:lnSpc>
+              <a:spcBef>
+                <a:spcPts val="0"/>
+              </a:spcBef>
+              <a:spcAft>
+                <a:spcPts val="0"/>
+              </a:spcAft>
+              <a:buClrTx/>
+              <a:buSzTx/>
+              <a:buFontTx/>
+              <a:buNone/>
+              <a:tabLst/>
+            </a:pPr>
+            <a:r>
+              <a:rPr kumimoji="0" lang="en-US" sz="900" b="0" i="0" u="none" strike="noStrike" kern="1200" cap="none" spc="0" normalizeH="0" baseline="0" noProof="0" dirty="0">
+                <a:ln>
+                  <a:noFill/>
+                </a:ln>
+                <a:solidFill>
+                  <a:schemeClr val="tx1"/>
+                </a:solidFill>
+                <a:effectLst/>
+                <a:uLnTx/>
+                <a:uFillTx/>
+                <a:latin typeface="Arial"/>
+                <a:ea typeface="+mn-ea"/>
+                <a:cs typeface="+mn-cs"/>
+              </a:rPr>
+              <a:t>Tune API, Schema, Integration</a:t>
+            </a:r>
+          </a:p>
+        </p:txBody>
+      </p:sp>
+      <p:sp>
+        <p:nvSpPr>
+          <p:cNvPr id="53" name="Rectangle 52">
+            <a:extLst>
+              <a:ext uri="{FF2B5EF4-FFF2-40B4-BE49-F238E27FC236}">
+                <a16:creationId xmlns:a16="http://schemas.microsoft.com/office/drawing/2014/main" id="{75111094-3CFA-8C46-AEE5-B62BDEBD9C5E}"/>
+              </a:ext>
+            </a:extLst>
+          </p:cNvPr>
+          <p:cNvSpPr/>
+          <p:nvPr/>
+        </p:nvSpPr>
+        <p:spPr>
+          <a:xfrm>
+            <a:off x="5670676" y="4010862"/>
+            <a:ext cx="914400" cy="455838"/>
+          </a:xfrm>
+          <a:prstGeom prst="rect">
+            <a:avLst/>
+          </a:prstGeom>
+          <a:solidFill>
+            <a:srgbClr val="44D035">
+              <a:alpha val="60000"/>
+            </a:srgbClr>
+          </a:solidFill>
+          <a:ln w="12700">
+            <a:solidFill>
+              <a:srgbClr val="92D050"/>
+            </a:solidFill>
+          </a:ln>
+        </p:spPr>
+        <p:style>
+          <a:lnRef idx="2">
+            <a:schemeClr val="accent1">
+              <a:shade val="50000"/>
+            </a:schemeClr>
+          </a:lnRef>
+          <a:fillRef idx="1">
+            <a:schemeClr val="accent1"/>
+          </a:fillRef>
+          <a:effectRef idx="0">
+            <a:schemeClr val="accent1"/>
+          </a:effectRef>
+          <a:fontRef idx="minor">
+            <a:schemeClr val="lt1"/>
+          </a:fontRef>
+        </p:style>
+        <p:txBody>
+          <a:bodyPr rtlCol="0" anchor="ctr"/>
+          <a:lstStyle/>
+          <a:p>
+            <a:pPr marL="0" marR="0" indent="0" algn="ctr" defTabSz="685800" rtl="0" eaLnBrk="1" fontAlgn="auto" latinLnBrk="0" hangingPunct="1">
+              <a:lnSpc>
+                <a:spcPct val="100000"/>
+              </a:lnSpc>
+              <a:spcBef>
+                <a:spcPts val="0"/>
+              </a:spcBef>
+              <a:spcAft>
+                <a:spcPts val="0"/>
+              </a:spcAft>
+              <a:buClrTx/>
+              <a:buSzTx/>
+              <a:buFontTx/>
+              <a:buNone/>
+              <a:tabLst/>
+            </a:pPr>
+            <a:r>
+              <a:rPr kumimoji="0" lang="en-US" sz="900" b="0" i="0" u="none" strike="noStrike" kern="1200" cap="none" spc="0" normalizeH="0" baseline="0" noProof="0" dirty="0">
+                <a:ln>
+                  <a:noFill/>
+                </a:ln>
+                <a:solidFill>
+                  <a:schemeClr val="tx1"/>
+                </a:solidFill>
+                <a:effectLst/>
+                <a:uLnTx/>
+                <a:uFillTx/>
+                <a:latin typeface="Arial"/>
+                <a:ea typeface="+mn-ea"/>
+                <a:cs typeface="+mn-cs"/>
+              </a:rPr>
+              <a:t>Tune API, Schema, Integration</a:t>
+            </a:r>
+          </a:p>
+        </p:txBody>
+      </p:sp>
+      <p:sp>
+        <p:nvSpPr>
+          <p:cNvPr id="56" name="Rectangle 55">
+            <a:extLst>
+              <a:ext uri="{FF2B5EF4-FFF2-40B4-BE49-F238E27FC236}">
+                <a16:creationId xmlns:a16="http://schemas.microsoft.com/office/drawing/2014/main" id="{9D4791D9-C140-CD46-98B9-B6FF204DFD1B}"/>
+              </a:ext>
+            </a:extLst>
+          </p:cNvPr>
+          <p:cNvSpPr/>
+          <p:nvPr/>
+        </p:nvSpPr>
+        <p:spPr>
+          <a:xfrm>
+            <a:off x="4711127" y="4023562"/>
+            <a:ext cx="914400" cy="455838"/>
+          </a:xfrm>
+          <a:prstGeom prst="rect">
+            <a:avLst/>
+          </a:prstGeom>
+          <a:solidFill>
+            <a:srgbClr val="44D035">
+              <a:alpha val="59000"/>
+            </a:srgbClr>
+          </a:solidFill>
+          <a:ln w="47625">
+            <a:solidFill>
+              <a:srgbClr val="FF0000">
+                <a:alpha val="34000"/>
+              </a:srgbClr>
+            </a:solidFill>
+          </a:ln>
+        </p:spPr>
+        <p:style>
+          <a:lnRef idx="2">
+            <a:schemeClr val="accent1">
+              <a:shade val="50000"/>
+            </a:schemeClr>
+          </a:lnRef>
+          <a:fillRef idx="1">
+            <a:schemeClr val="accent1"/>
+          </a:fillRef>
+          <a:effectRef idx="0">
+            <a:schemeClr val="accent1"/>
+          </a:effectRef>
+          <a:fontRef idx="minor">
+            <a:schemeClr val="lt1"/>
+          </a:fontRef>
+        </p:style>
+        <p:txBody>
+          <a:bodyPr rtlCol="0" anchor="ctr"/>
+          <a:lstStyle/>
+          <a:p>
+            <a:pPr marL="0" marR="0" indent="0" algn="ctr" defTabSz="685800" rtl="0" eaLnBrk="1" fontAlgn="auto" latinLnBrk="0" hangingPunct="1">
+              <a:lnSpc>
+                <a:spcPct val="100000"/>
+              </a:lnSpc>
+              <a:spcBef>
+                <a:spcPts val="0"/>
+              </a:spcBef>
+              <a:spcAft>
+                <a:spcPts val="0"/>
+              </a:spcAft>
+              <a:buClrTx/>
+              <a:buSzTx/>
+              <a:buFontTx/>
+              <a:buNone/>
+              <a:tabLst/>
+            </a:pPr>
+            <a:r>
+              <a:rPr kumimoji="0" lang="en-US" sz="1000" b="0" i="0" u="none" strike="noStrike" kern="1200" cap="none" spc="0" normalizeH="0" baseline="0" noProof="0" dirty="0">
+                <a:ln>
+                  <a:noFill/>
+                </a:ln>
+                <a:solidFill>
+                  <a:schemeClr val="tx1"/>
+                </a:solidFill>
+                <a:effectLst/>
+                <a:uLnTx/>
+                <a:uFillTx/>
+                <a:latin typeface="Arial"/>
+                <a:ea typeface="+mn-ea"/>
+                <a:cs typeface="+mn-cs"/>
+              </a:rPr>
+              <a:t>Build Data </a:t>
+            </a:r>
+          </a:p>
+          <a:p>
+            <a:pPr marL="0" marR="0" indent="0" algn="ctr" defTabSz="685800" rtl="0" eaLnBrk="1" fontAlgn="auto" latinLnBrk="0" hangingPunct="1">
+              <a:lnSpc>
+                <a:spcPct val="100000"/>
+              </a:lnSpc>
+              <a:spcBef>
+                <a:spcPts val="0"/>
+              </a:spcBef>
+              <a:spcAft>
+                <a:spcPts val="0"/>
+              </a:spcAft>
+              <a:buClrTx/>
+              <a:buSzTx/>
+              <a:buFontTx/>
+              <a:buNone/>
+              <a:tabLst/>
+            </a:pPr>
+            <a:r>
+              <a:rPr kumimoji="0" lang="en-US" sz="1000" b="0" i="0" u="none" strike="noStrike" kern="1200" cap="none" spc="0" normalizeH="0" baseline="0" noProof="0" dirty="0">
+                <a:ln>
+                  <a:noFill/>
+                </a:ln>
+                <a:solidFill>
+                  <a:schemeClr val="tx1"/>
+                </a:solidFill>
+                <a:effectLst/>
+                <a:uLnTx/>
+                <a:uFillTx/>
+                <a:latin typeface="Arial"/>
+                <a:ea typeface="+mn-ea"/>
+                <a:cs typeface="+mn-cs"/>
+              </a:rPr>
+              <a:t>API</a:t>
+            </a:r>
           </a:p>
         </p:txBody>
       </p:sp>
@@ -26613,7 +26806,7 @@
             <a:effectLst/>
             <a:extLst>
               <a:ext uri="{C572A759-6A51-4108-AA02-DFA0A04FC94B}">
-                <ma14:wrappingTextBoxFlag xmlns="" xmlns:m="http://schemas.openxmlformats.org/officeDocument/2006/math" xmlns:a14="http://schemas.microsoft.com/office/drawing/2010/main" xmlns:ma14="http://schemas.microsoft.com/office/mac/drawingml/2011/main" val="1"/>
+                <ma14:wrappingTextBoxFlag xmlns:ma14="http://schemas.microsoft.com/office/mac/drawingml/2011/main" xmlns:a14="http://schemas.microsoft.com/office/drawing/2010/main" xmlns:m="http://schemas.openxmlformats.org/officeDocument/2006/math" xmlns="" val="1"/>
               </a:ext>
             </a:extLst>
           </p:spPr>
@@ -26788,7 +26981,7 @@
             <a:effectLst/>
             <a:extLst>
               <a:ext uri="{C572A759-6A51-4108-AA02-DFA0A04FC94B}">
-                <ma14:wrappingTextBoxFlag xmlns="" xmlns:m="http://schemas.openxmlformats.org/officeDocument/2006/math" xmlns:a14="http://schemas.microsoft.com/office/drawing/2010/main" xmlns:ma14="http://schemas.microsoft.com/office/mac/drawingml/2011/main" val="1"/>
+                <ma14:wrappingTextBoxFlag xmlns:ma14="http://schemas.microsoft.com/office/mac/drawingml/2011/main" xmlns:a14="http://schemas.microsoft.com/office/drawing/2010/main" xmlns:m="http://schemas.openxmlformats.org/officeDocument/2006/math" xmlns="" val="1"/>
               </a:ext>
             </a:extLst>
           </p:spPr>
@@ -26963,7 +27156,7 @@
             <a:effectLst/>
             <a:extLst>
               <a:ext uri="{C572A759-6A51-4108-AA02-DFA0A04FC94B}">
-                <ma14:wrappingTextBoxFlag xmlns="" xmlns:m="http://schemas.openxmlformats.org/officeDocument/2006/math" xmlns:a14="http://schemas.microsoft.com/office/drawing/2010/main" xmlns:ma14="http://schemas.microsoft.com/office/mac/drawingml/2011/main" val="1"/>
+                <ma14:wrappingTextBoxFlag xmlns:ma14="http://schemas.microsoft.com/office/mac/drawingml/2011/main" xmlns:a14="http://schemas.microsoft.com/office/drawing/2010/main" xmlns:m="http://schemas.openxmlformats.org/officeDocument/2006/math" xmlns="" val="1"/>
               </a:ext>
             </a:extLst>
           </p:spPr>
@@ -27125,7 +27318,7 @@
             <a:effectLst/>
             <a:extLst>
               <a:ext uri="{C572A759-6A51-4108-AA02-DFA0A04FC94B}">
-                <ma14:wrappingTextBoxFlag xmlns="" xmlns:m="http://schemas.openxmlformats.org/officeDocument/2006/math" xmlns:a14="http://schemas.microsoft.com/office/drawing/2010/main" xmlns:ma14="http://schemas.microsoft.com/office/mac/drawingml/2011/main" val="1"/>
+                <ma14:wrappingTextBoxFlag xmlns:ma14="http://schemas.microsoft.com/office/mac/drawingml/2011/main" xmlns:a14="http://schemas.microsoft.com/office/drawing/2010/main" xmlns:m="http://schemas.openxmlformats.org/officeDocument/2006/math" xmlns="" val="1"/>
               </a:ext>
             </a:extLst>
           </p:spPr>
@@ -27286,7 +27479,7 @@
             <a:effectLst/>
             <a:extLst>
               <a:ext uri="{C572A759-6A51-4108-AA02-DFA0A04FC94B}">
-                <ma14:wrappingTextBoxFlag xmlns="" xmlns:m="http://schemas.openxmlformats.org/officeDocument/2006/math" xmlns:a14="http://schemas.microsoft.com/office/drawing/2010/main" xmlns:ma14="http://schemas.microsoft.com/office/mac/drawingml/2011/main" val="1"/>
+                <ma14:wrappingTextBoxFlag xmlns:ma14="http://schemas.microsoft.com/office/mac/drawingml/2011/main" xmlns:a14="http://schemas.microsoft.com/office/drawing/2010/main" xmlns:m="http://schemas.openxmlformats.org/officeDocument/2006/math" xmlns="" val="1"/>
               </a:ext>
             </a:extLst>
           </p:spPr>
@@ -27474,7 +27667,7 @@
             <a:effectLst/>
             <a:extLst>
               <a:ext uri="{C572A759-6A51-4108-AA02-DFA0A04FC94B}">
-                <ma14:wrappingTextBoxFlag xmlns="" xmlns:m="http://schemas.openxmlformats.org/officeDocument/2006/math" xmlns:a14="http://schemas.microsoft.com/office/drawing/2010/main" xmlns:ma14="http://schemas.microsoft.com/office/mac/drawingml/2011/main" val="1"/>
+                <ma14:wrappingTextBoxFlag xmlns:ma14="http://schemas.microsoft.com/office/mac/drawingml/2011/main" xmlns:a14="http://schemas.microsoft.com/office/drawing/2010/main" xmlns:m="http://schemas.openxmlformats.org/officeDocument/2006/math" xmlns="" val="1"/>
               </a:ext>
             </a:extLst>
           </p:spPr>
@@ -27638,7 +27831,7 @@
             <a:effectLst/>
             <a:extLst>
               <a:ext uri="{C572A759-6A51-4108-AA02-DFA0A04FC94B}">
-                <ma14:wrappingTextBoxFlag xmlns="" xmlns:m="http://schemas.openxmlformats.org/officeDocument/2006/math" xmlns:a14="http://schemas.microsoft.com/office/drawing/2010/main" xmlns:ma14="http://schemas.microsoft.com/office/mac/drawingml/2011/main" val="1"/>
+                <ma14:wrappingTextBoxFlag xmlns:ma14="http://schemas.microsoft.com/office/mac/drawingml/2011/main" xmlns:a14="http://schemas.microsoft.com/office/drawing/2010/main" xmlns:m="http://schemas.openxmlformats.org/officeDocument/2006/math" xmlns="" val="1"/>
               </a:ext>
             </a:extLst>
           </p:spPr>
@@ -27674,7 +27867,7 @@
                   <a:ea typeface="Helvetica Neue Medium"/>
                   <a:cs typeface="Helvetica Neue Medium"/>
                 </a:rPr>
-                <a:t>Build data access integration</a:t>
+                <a:t>Deploy data integration</a:t>
               </a:r>
               <a:endParaRPr sz="1400" kern="0" dirty="0">
                 <a:latin typeface="Helvetica Neue Medium"/>
@@ -27797,7 +27990,7 @@
             <a:effectLst/>
             <a:extLst>
               <a:ext uri="{C572A759-6A51-4108-AA02-DFA0A04FC94B}">
-                <ma14:wrappingTextBoxFlag xmlns="" xmlns:m="http://schemas.openxmlformats.org/officeDocument/2006/math" xmlns:a14="http://schemas.microsoft.com/office/drawing/2010/main" xmlns:ma14="http://schemas.microsoft.com/office/mac/drawingml/2011/main" val="1"/>
+                <ma14:wrappingTextBoxFlag xmlns:ma14="http://schemas.microsoft.com/office/mac/drawingml/2011/main" xmlns:a14="http://schemas.microsoft.com/office/drawing/2010/main" xmlns:m="http://schemas.openxmlformats.org/officeDocument/2006/math" xmlns="" val="1"/>
               </a:ext>
             </a:extLst>
           </p:spPr>
@@ -27956,7 +28149,7 @@
             <a:effectLst/>
             <a:extLst>
               <a:ext uri="{C572A759-6A51-4108-AA02-DFA0A04FC94B}">
-                <ma14:wrappingTextBoxFlag xmlns="" xmlns:m="http://schemas.openxmlformats.org/officeDocument/2006/math" xmlns:a14="http://schemas.microsoft.com/office/drawing/2010/main" xmlns:ma14="http://schemas.microsoft.com/office/mac/drawingml/2011/main" val="1"/>
+                <ma14:wrappingTextBoxFlag xmlns:ma14="http://schemas.microsoft.com/office/mac/drawingml/2011/main" xmlns:a14="http://schemas.microsoft.com/office/drawing/2010/main" xmlns:m="http://schemas.openxmlformats.org/officeDocument/2006/math" xmlns="" val="1"/>
               </a:ext>
             </a:extLst>
           </p:spPr>
@@ -28167,7 +28360,7 @@
             <a:effectLst/>
             <a:extLst>
               <a:ext uri="{C572A759-6A51-4108-AA02-DFA0A04FC94B}">
-                <ma14:wrappingTextBoxFlag xmlns="" xmlns:m="http://schemas.openxmlformats.org/officeDocument/2006/math" xmlns:a14="http://schemas.microsoft.com/office/drawing/2010/main" xmlns:ma14="http://schemas.microsoft.com/office/mac/drawingml/2011/main" val="1"/>
+                <ma14:wrappingTextBoxFlag xmlns:ma14="http://schemas.microsoft.com/office/mac/drawingml/2011/main" xmlns:a14="http://schemas.microsoft.com/office/drawing/2010/main" xmlns:m="http://schemas.openxmlformats.org/officeDocument/2006/math" xmlns="" val="1"/>
               </a:ext>
             </a:extLst>
           </p:spPr>
@@ -28943,7 +29136,7 @@
           <a:effectLst/>
           <a:extLst>
             <a:ext uri="{C572A759-6A51-4108-AA02-DFA0A04FC94B}">
-              <ma14:wrappingTextBoxFlag xmlns="" xmlns:m="http://schemas.openxmlformats.org/officeDocument/2006/math" xmlns:a14="http://schemas.microsoft.com/office/drawing/2010/main" xmlns:ma14="http://schemas.microsoft.com/office/mac/drawingml/2011/main" val="1"/>
+              <ma14:wrappingTextBoxFlag xmlns:ma14="http://schemas.microsoft.com/office/mac/drawingml/2011/main" xmlns:a14="http://schemas.microsoft.com/office/drawing/2010/main" xmlns:m="http://schemas.openxmlformats.org/officeDocument/2006/math" xmlns="" val="1"/>
             </a:ext>
           </a:extLst>
         </p:spPr>
@@ -29187,7 +29380,7 @@
             <a:effectLst/>
             <a:extLst>
               <a:ext uri="{C572A759-6A51-4108-AA02-DFA0A04FC94B}">
-                <ma14:wrappingTextBoxFlag xmlns="" xmlns:m="http://schemas.openxmlformats.org/officeDocument/2006/math" xmlns:a14="http://schemas.microsoft.com/office/drawing/2010/main" xmlns:ma14="http://schemas.microsoft.com/office/mac/drawingml/2011/main" val="1"/>
+                <ma14:wrappingTextBoxFlag xmlns:ma14="http://schemas.microsoft.com/office/mac/drawingml/2011/main" xmlns:a14="http://schemas.microsoft.com/office/drawing/2010/main" xmlns:m="http://schemas.openxmlformats.org/officeDocument/2006/math" xmlns="" val="1"/>
               </a:ext>
             </a:extLst>
           </p:spPr>
@@ -29453,7 +29646,7 @@
             <a:effectLst/>
             <a:extLst>
               <a:ext uri="{C572A759-6A51-4108-AA02-DFA0A04FC94B}">
-                <ma14:wrappingTextBoxFlag xmlns="" xmlns:m="http://schemas.openxmlformats.org/officeDocument/2006/math" xmlns:a14="http://schemas.microsoft.com/office/drawing/2010/main" xmlns:ma14="http://schemas.microsoft.com/office/mac/drawingml/2011/main" val="1"/>
+                <ma14:wrappingTextBoxFlag xmlns:ma14="http://schemas.microsoft.com/office/mac/drawingml/2011/main" xmlns:a14="http://schemas.microsoft.com/office/drawing/2010/main" xmlns:m="http://schemas.openxmlformats.org/officeDocument/2006/math" xmlns="" val="1"/>
               </a:ext>
             </a:extLst>
           </p:spPr>
@@ -29620,7 +29813,7 @@
             <a:effectLst/>
             <a:extLst>
               <a:ext uri="{C572A759-6A51-4108-AA02-DFA0A04FC94B}">
-                <ma14:wrappingTextBoxFlag xmlns="" xmlns:m="http://schemas.openxmlformats.org/officeDocument/2006/math" xmlns:a14="http://schemas.microsoft.com/office/drawing/2010/main" xmlns:ma14="http://schemas.microsoft.com/office/mac/drawingml/2011/main" val="1"/>
+                <ma14:wrappingTextBoxFlag xmlns:ma14="http://schemas.microsoft.com/office/mac/drawingml/2011/main" xmlns:a14="http://schemas.microsoft.com/office/drawing/2010/main" xmlns:m="http://schemas.openxmlformats.org/officeDocument/2006/math" xmlns="" val="1"/>
               </a:ext>
             </a:extLst>
           </p:spPr>
@@ -29783,7 +29976,7 @@
             <a:effectLst/>
             <a:extLst>
               <a:ext uri="{C572A759-6A51-4108-AA02-DFA0A04FC94B}">
-                <ma14:wrappingTextBoxFlag xmlns="" xmlns:m="http://schemas.openxmlformats.org/officeDocument/2006/math" xmlns:a14="http://schemas.microsoft.com/office/drawing/2010/main" xmlns:ma14="http://schemas.microsoft.com/office/mac/drawingml/2011/main" val="1"/>
+                <ma14:wrappingTextBoxFlag xmlns:ma14="http://schemas.microsoft.com/office/mac/drawingml/2011/main" xmlns:a14="http://schemas.microsoft.com/office/drawing/2010/main" xmlns:m="http://schemas.openxmlformats.org/officeDocument/2006/math" xmlns="" val="1"/>
               </a:ext>
             </a:extLst>
           </p:spPr>
@@ -29946,7 +30139,7 @@
             <a:effectLst/>
             <a:extLst>
               <a:ext uri="{C572A759-6A51-4108-AA02-DFA0A04FC94B}">
-                <ma14:wrappingTextBoxFlag xmlns="" xmlns:m="http://schemas.openxmlformats.org/officeDocument/2006/math" xmlns:a14="http://schemas.microsoft.com/office/drawing/2010/main" xmlns:ma14="http://schemas.microsoft.com/office/mac/drawingml/2011/main" val="1"/>
+                <ma14:wrappingTextBoxFlag xmlns:ma14="http://schemas.microsoft.com/office/mac/drawingml/2011/main" xmlns:a14="http://schemas.microsoft.com/office/drawing/2010/main" xmlns:m="http://schemas.openxmlformats.org/officeDocument/2006/math" xmlns="" val="1"/>
               </a:ext>
             </a:extLst>
           </p:spPr>
@@ -30112,7 +30305,7 @@
             <a:effectLst/>
             <a:extLst>
               <a:ext uri="{C572A759-6A51-4108-AA02-DFA0A04FC94B}">
-                <ma14:wrappingTextBoxFlag xmlns="" xmlns:m="http://schemas.openxmlformats.org/officeDocument/2006/math" xmlns:a14="http://schemas.microsoft.com/office/drawing/2010/main" xmlns:ma14="http://schemas.microsoft.com/office/mac/drawingml/2011/main" val="1"/>
+                <ma14:wrappingTextBoxFlag xmlns:ma14="http://schemas.microsoft.com/office/mac/drawingml/2011/main" xmlns:a14="http://schemas.microsoft.com/office/drawing/2010/main" xmlns:m="http://schemas.openxmlformats.org/officeDocument/2006/math" xmlns="" val="1"/>
               </a:ext>
             </a:extLst>
           </p:spPr>
@@ -30279,7 +30472,7 @@
             <a:effectLst/>
             <a:extLst>
               <a:ext uri="{C572A759-6A51-4108-AA02-DFA0A04FC94B}">
-                <ma14:wrappingTextBoxFlag xmlns="" xmlns:m="http://schemas.openxmlformats.org/officeDocument/2006/math" xmlns:a14="http://schemas.microsoft.com/office/drawing/2010/main" xmlns:ma14="http://schemas.microsoft.com/office/mac/drawingml/2011/main" val="1"/>
+                <ma14:wrappingTextBoxFlag xmlns:ma14="http://schemas.microsoft.com/office/mac/drawingml/2011/main" xmlns:a14="http://schemas.microsoft.com/office/drawing/2010/main" xmlns:m="http://schemas.openxmlformats.org/officeDocument/2006/math" xmlns="" val="1"/>
               </a:ext>
             </a:extLst>
           </p:spPr>
@@ -30446,7 +30639,7 @@
             <a:effectLst/>
             <a:extLst>
               <a:ext uri="{C572A759-6A51-4108-AA02-DFA0A04FC94B}">
-                <ma14:wrappingTextBoxFlag xmlns="" xmlns:m="http://schemas.openxmlformats.org/officeDocument/2006/math" xmlns:a14="http://schemas.microsoft.com/office/drawing/2010/main" xmlns:ma14="http://schemas.microsoft.com/office/mac/drawingml/2011/main" val="1"/>
+                <ma14:wrappingTextBoxFlag xmlns:ma14="http://schemas.microsoft.com/office/mac/drawingml/2011/main" xmlns:a14="http://schemas.microsoft.com/office/drawing/2010/main" xmlns:m="http://schemas.openxmlformats.org/officeDocument/2006/math" xmlns="" val="1"/>
               </a:ext>
             </a:extLst>
           </p:spPr>
@@ -30974,7 +31167,7 @@
           <a:effectLst/>
           <a:extLst>
             <a:ext uri="{C572A759-6A51-4108-AA02-DFA0A04FC94B}">
-              <ma14:wrappingTextBoxFlag xmlns="" xmlns:m="http://schemas.openxmlformats.org/officeDocument/2006/math" xmlns:a14="http://schemas.microsoft.com/office/drawing/2010/main" xmlns:ma14="http://schemas.microsoft.com/office/mac/drawingml/2011/main" val="1"/>
+              <ma14:wrappingTextBoxFlag xmlns:ma14="http://schemas.microsoft.com/office/mac/drawingml/2011/main" xmlns:a14="http://schemas.microsoft.com/office/drawing/2010/main" xmlns:m="http://schemas.openxmlformats.org/officeDocument/2006/math" xmlns="" val="1"/>
             </a:ext>
           </a:extLst>
         </p:spPr>

</xml_diff>